<commit_message>
Installer for Inventor Addin and Vault Extension
</commit_message>
<xml_diff>
--- a/Autodesk.TS.VaultPlmClientExtensions.pptx
+++ b/Autodesk.TS.VaultPlmClientExtensions.pptx
@@ -11272,8 +11272,8 @@
         </p:nvSpPr>
         <p:spPr>
           <a:xfrm>
-            <a:off x="2588385" y="2360815"/>
-            <a:ext cx="9354828" cy="1459508"/>
+            <a:off x="2588385" y="2343124"/>
+            <a:ext cx="9354828" cy="1477199"/>
           </a:xfrm>
         </p:spPr>
         <p:txBody>
@@ -11289,7 +11289,15 @@
             </a:br>
             <a:r>
               <a:rPr lang="en-US" dirty="0"/>
-              <a:t>Vault PLM Client Extensions</a:t>
+              <a:t>Vault </a:t>
+            </a:r>
+            <a:r>
+              <a:rPr lang="en-US" dirty="0" err="1"/>
+              <a:t>plm</a:t>
+            </a:r>
+            <a:r>
+              <a:rPr lang="en-US" dirty="0"/>
+              <a:t> Client Extensions</a:t>
             </a:r>
             <a:endParaRPr lang="en-DE" dirty="0"/>
           </a:p>
@@ -11846,6 +11854,36 @@
           </a:p>
         </p:txBody>
       </p:sp>
+      <p:pic>
+        <p:nvPicPr>
+          <p:cNvPr id="8" name="Picture 7">
+            <a:extLst>
+              <a:ext uri="{FF2B5EF4-FFF2-40B4-BE49-F238E27FC236}">
+                <a16:creationId xmlns:a16="http://schemas.microsoft.com/office/drawing/2014/main" id="{EFA931EA-391F-9EE4-0BF1-2DB567F1A0A5}"/>
+              </a:ext>
+            </a:extLst>
+          </p:cNvPr>
+          <p:cNvPicPr>
+            <a:picLocks noChangeAspect="1"/>
+          </p:cNvPicPr>
+          <p:nvPr/>
+        </p:nvPicPr>
+        <p:blipFill>
+          <a:blip r:embed="rId2"/>
+          <a:stretch>
+            <a:fillRect/>
+          </a:stretch>
+        </p:blipFill>
+        <p:spPr>
+          <a:xfrm>
+            <a:off x="184150" y="1019109"/>
+            <a:ext cx="3719885" cy="1020100"/>
+          </a:xfrm>
+          <a:prstGeom prst="rect">
+            <a:avLst/>
+          </a:prstGeom>
+        </p:spPr>
+      </p:pic>
     </p:spTree>
     <p:extLst>
       <p:ext uri="{BB962C8B-B14F-4D97-AF65-F5344CB8AC3E}">
@@ -12398,13 +12436,13 @@
   <p:clrMapOvr>
     <a:masterClrMapping/>
   </p:clrMapOvr>
-  <mc:AlternateContent xmlns:mc="http://schemas.openxmlformats.org/markup-compatibility/2006">
-    <mc:Choice xmlns:p14="http://schemas.microsoft.com/office/powerpoint/2010/main" Requires="p14">
+  <mc:AlternateContent xmlns:mc="http://schemas.openxmlformats.org/markup-compatibility/2006" xmlns:p14="http://schemas.microsoft.com/office/powerpoint/2010/main">
+    <mc:Choice Requires="p14">
       <p:transition p14:dur="250">
         <p:fade/>
       </p:transition>
     </mc:Choice>
-    <mc:Fallback>
+    <mc:Fallback xmlns="">
       <p:transition>
         <p:fade/>
       </p:transition>
@@ -12674,13 +12712,13 @@
   <p:clrMapOvr>
     <a:masterClrMapping/>
   </p:clrMapOvr>
-  <mc:AlternateContent xmlns:mc="http://schemas.openxmlformats.org/markup-compatibility/2006">
-    <mc:Choice xmlns:p14="http://schemas.microsoft.com/office/powerpoint/2010/main" Requires="p14">
+  <mc:AlternateContent xmlns:mc="http://schemas.openxmlformats.org/markup-compatibility/2006" xmlns:p14="http://schemas.microsoft.com/office/powerpoint/2010/main">
+    <mc:Choice Requires="p14">
       <p:transition p14:dur="250">
         <p:fade/>
       </p:transition>
     </mc:Choice>
-    <mc:Fallback>
+    <mc:Fallback xmlns="">
       <p:transition>
         <p:fade/>
       </p:transition>

</xml_diff>